<commit_message>
Cleaned up related research, state space analysis, conclusions and future work
</commit_message>
<xml_diff>
--- a/src/img/source-2.pptx
+++ b/src/img/source-2.pptx
@@ -7,6 +7,7 @@
   <p:sldIdLst>
     <p:sldId id="256" r:id="rId2"/>
     <p:sldId id="257" r:id="rId3"/>
+    <p:sldId id="258" r:id="rId4"/>
   </p:sldIdLst>
   <p:sldSz cx="12192000" cy="6858000"/>
   <p:notesSz cx="6858000" cy="9144000"/>
@@ -242,7 +243,7 @@
           <a:p>
             <a:fld id="{E1F60DCA-AAD4-4732-9BAD-8406E14A866C}" type="datetimeFigureOut">
               <a:rPr lang="en-US" smtClean="0"/>
-              <a:t>5/4/2016</a:t>
+              <a:t>5/9/2016</a:t>
             </a:fld>
             <a:endParaRPr lang="en-US" dirty="0"/>
           </a:p>
@@ -410,7 +411,7 @@
           <a:p>
             <a:fld id="{E1F60DCA-AAD4-4732-9BAD-8406E14A866C}" type="datetimeFigureOut">
               <a:rPr lang="en-US" smtClean="0"/>
-              <a:t>5/4/2016</a:t>
+              <a:t>5/9/2016</a:t>
             </a:fld>
             <a:endParaRPr lang="en-US" dirty="0"/>
           </a:p>
@@ -588,7 +589,7 @@
           <a:p>
             <a:fld id="{E1F60DCA-AAD4-4732-9BAD-8406E14A866C}" type="datetimeFigureOut">
               <a:rPr lang="en-US" smtClean="0"/>
-              <a:t>5/4/2016</a:t>
+              <a:t>5/9/2016</a:t>
             </a:fld>
             <a:endParaRPr lang="en-US" dirty="0"/>
           </a:p>
@@ -756,7 +757,7 @@
           <a:p>
             <a:fld id="{E1F60DCA-AAD4-4732-9BAD-8406E14A866C}" type="datetimeFigureOut">
               <a:rPr lang="en-US" smtClean="0"/>
-              <a:t>5/4/2016</a:t>
+              <a:t>5/9/2016</a:t>
             </a:fld>
             <a:endParaRPr lang="en-US" dirty="0"/>
           </a:p>
@@ -1001,7 +1002,7 @@
           <a:p>
             <a:fld id="{E1F60DCA-AAD4-4732-9BAD-8406E14A866C}" type="datetimeFigureOut">
               <a:rPr lang="en-US" smtClean="0"/>
-              <a:t>5/4/2016</a:t>
+              <a:t>5/9/2016</a:t>
             </a:fld>
             <a:endParaRPr lang="en-US" dirty="0"/>
           </a:p>
@@ -1230,7 +1231,7 @@
           <a:p>
             <a:fld id="{E1F60DCA-AAD4-4732-9BAD-8406E14A866C}" type="datetimeFigureOut">
               <a:rPr lang="en-US" smtClean="0"/>
-              <a:t>5/4/2016</a:t>
+              <a:t>5/9/2016</a:t>
             </a:fld>
             <a:endParaRPr lang="en-US" dirty="0"/>
           </a:p>
@@ -1594,7 +1595,7 @@
           <a:p>
             <a:fld id="{E1F60DCA-AAD4-4732-9BAD-8406E14A866C}" type="datetimeFigureOut">
               <a:rPr lang="en-US" smtClean="0"/>
-              <a:t>5/4/2016</a:t>
+              <a:t>5/9/2016</a:t>
             </a:fld>
             <a:endParaRPr lang="en-US" dirty="0"/>
           </a:p>
@@ -1711,7 +1712,7 @@
           <a:p>
             <a:fld id="{E1F60DCA-AAD4-4732-9BAD-8406E14A866C}" type="datetimeFigureOut">
               <a:rPr lang="en-US" smtClean="0"/>
-              <a:t>5/4/2016</a:t>
+              <a:t>5/9/2016</a:t>
             </a:fld>
             <a:endParaRPr lang="en-US" dirty="0"/>
           </a:p>
@@ -1806,7 +1807,7 @@
           <a:p>
             <a:fld id="{E1F60DCA-AAD4-4732-9BAD-8406E14A866C}" type="datetimeFigureOut">
               <a:rPr lang="en-US" smtClean="0"/>
-              <a:t>5/4/2016</a:t>
+              <a:t>5/9/2016</a:t>
             </a:fld>
             <a:endParaRPr lang="en-US" dirty="0"/>
           </a:p>
@@ -2081,7 +2082,7 @@
           <a:p>
             <a:fld id="{E1F60DCA-AAD4-4732-9BAD-8406E14A866C}" type="datetimeFigureOut">
               <a:rPr lang="en-US" smtClean="0"/>
-              <a:t>5/4/2016</a:t>
+              <a:t>5/9/2016</a:t>
             </a:fld>
             <a:endParaRPr lang="en-US" dirty="0"/>
           </a:p>
@@ -2333,7 +2334,7 @@
           <a:p>
             <a:fld id="{E1F60DCA-AAD4-4732-9BAD-8406E14A866C}" type="datetimeFigureOut">
               <a:rPr lang="en-US" smtClean="0"/>
-              <a:t>5/4/2016</a:t>
+              <a:t>5/9/2016</a:t>
             </a:fld>
             <a:endParaRPr lang="en-US" dirty="0"/>
           </a:p>
@@ -2544,7 +2545,7 @@
           <a:p>
             <a:fld id="{E1F60DCA-AAD4-4732-9BAD-8406E14A866C}" type="datetimeFigureOut">
               <a:rPr lang="en-US" smtClean="0"/>
-              <a:t>5/4/2016</a:t>
+              <a:t>5/9/2016</a:t>
             </a:fld>
             <a:endParaRPr lang="en-US" dirty="0"/>
           </a:p>
@@ -3263,6 +3264,596 @@
 </p:sld>
 </file>
 
+<file path=ppt/slides/slide3.xml><?xml version="1.0" encoding="utf-8"?>
+<p:sld xmlns:a="http://schemas.openxmlformats.org/drawingml/2006/main" xmlns:r="http://schemas.openxmlformats.org/officeDocument/2006/relationships" xmlns:p="http://schemas.openxmlformats.org/presentationml/2006/main">
+  <p:cSld>
+    <p:spTree>
+      <p:nvGrpSpPr>
+        <p:cNvPr id="1" name=""/>
+        <p:cNvGrpSpPr/>
+        <p:nvPr/>
+      </p:nvGrpSpPr>
+      <p:grpSpPr>
+        <a:xfrm>
+          <a:off x="0" y="0"/>
+          <a:ext cx="0" cy="0"/>
+          <a:chOff x="0" y="0"/>
+          <a:chExt cx="0" cy="0"/>
+        </a:xfrm>
+      </p:grpSpPr>
+      <p:cxnSp>
+        <p:nvCxnSpPr>
+          <p:cNvPr id="13" name="Straight Connector 12"/>
+          <p:cNvCxnSpPr/>
+          <p:nvPr/>
+        </p:nvCxnSpPr>
+        <p:spPr>
+          <a:xfrm>
+            <a:off x="693270" y="1045882"/>
+            <a:ext cx="0" cy="2312894"/>
+          </a:xfrm>
+          <a:prstGeom prst="line">
+            <a:avLst/>
+          </a:prstGeom>
+          <a:ln w="25400">
+            <a:solidFill>
+              <a:srgbClr val="C00000"/>
+            </a:solidFill>
+          </a:ln>
+        </p:spPr>
+        <p:style>
+          <a:lnRef idx="1">
+            <a:schemeClr val="accent1"/>
+          </a:lnRef>
+          <a:fillRef idx="0">
+            <a:schemeClr val="accent1"/>
+          </a:fillRef>
+          <a:effectRef idx="0">
+            <a:schemeClr val="accent1"/>
+          </a:effectRef>
+          <a:fontRef idx="minor">
+            <a:schemeClr val="tx1"/>
+          </a:fontRef>
+        </p:style>
+      </p:cxnSp>
+      <p:cxnSp>
+        <p:nvCxnSpPr>
+          <p:cNvPr id="16" name="Straight Connector 15"/>
+          <p:cNvCxnSpPr/>
+          <p:nvPr/>
+        </p:nvCxnSpPr>
+        <p:spPr>
+          <a:xfrm>
+            <a:off x="1897529" y="1045882"/>
+            <a:ext cx="0" cy="2312894"/>
+          </a:xfrm>
+          <a:prstGeom prst="line">
+            <a:avLst/>
+          </a:prstGeom>
+          <a:ln w="25400">
+            <a:solidFill>
+              <a:srgbClr val="C00000"/>
+            </a:solidFill>
+          </a:ln>
+        </p:spPr>
+        <p:style>
+          <a:lnRef idx="1">
+            <a:schemeClr val="accent1"/>
+          </a:lnRef>
+          <a:fillRef idx="0">
+            <a:schemeClr val="accent1"/>
+          </a:fillRef>
+          <a:effectRef idx="0">
+            <a:schemeClr val="accent1"/>
+          </a:effectRef>
+          <a:fontRef idx="minor">
+            <a:schemeClr val="tx1"/>
+          </a:fontRef>
+        </p:style>
+      </p:cxnSp>
+      <p:cxnSp>
+        <p:nvCxnSpPr>
+          <p:cNvPr id="18" name="Straight Connector 17"/>
+          <p:cNvCxnSpPr/>
+          <p:nvPr/>
+        </p:nvCxnSpPr>
+        <p:spPr>
+          <a:xfrm>
+            <a:off x="3185458" y="1523999"/>
+            <a:ext cx="0" cy="1834777"/>
+          </a:xfrm>
+          <a:prstGeom prst="line">
+            <a:avLst/>
+          </a:prstGeom>
+          <a:ln w="25400">
+            <a:solidFill>
+              <a:srgbClr val="C00000"/>
+            </a:solidFill>
+          </a:ln>
+        </p:spPr>
+        <p:style>
+          <a:lnRef idx="1">
+            <a:schemeClr val="accent1"/>
+          </a:lnRef>
+          <a:fillRef idx="0">
+            <a:schemeClr val="accent1"/>
+          </a:fillRef>
+          <a:effectRef idx="0">
+            <a:schemeClr val="accent1"/>
+          </a:effectRef>
+          <a:fontRef idx="minor">
+            <a:schemeClr val="tx1"/>
+          </a:fontRef>
+        </p:style>
+      </p:cxnSp>
+      <p:cxnSp>
+        <p:nvCxnSpPr>
+          <p:cNvPr id="20" name="Straight Connector 19"/>
+          <p:cNvCxnSpPr/>
+          <p:nvPr/>
+        </p:nvCxnSpPr>
+        <p:spPr>
+          <a:xfrm flipH="1">
+            <a:off x="4434541" y="1523999"/>
+            <a:ext cx="5977" cy="1834777"/>
+          </a:xfrm>
+          <a:prstGeom prst="line">
+            <a:avLst/>
+          </a:prstGeom>
+          <a:ln w="25400">
+            <a:solidFill>
+              <a:srgbClr val="C00000"/>
+            </a:solidFill>
+          </a:ln>
+        </p:spPr>
+        <p:style>
+          <a:lnRef idx="1">
+            <a:schemeClr val="accent1"/>
+          </a:lnRef>
+          <a:fillRef idx="0">
+            <a:schemeClr val="accent1"/>
+          </a:fillRef>
+          <a:effectRef idx="0">
+            <a:schemeClr val="accent1"/>
+          </a:effectRef>
+          <a:fontRef idx="minor">
+            <a:schemeClr val="tx1"/>
+          </a:fontRef>
+        </p:style>
+      </p:cxnSp>
+      <p:cxnSp>
+        <p:nvCxnSpPr>
+          <p:cNvPr id="22" name="Straight Connector 21"/>
+          <p:cNvCxnSpPr/>
+          <p:nvPr/>
+        </p:nvCxnSpPr>
+        <p:spPr>
+          <a:xfrm>
+            <a:off x="5710516" y="1523999"/>
+            <a:ext cx="11954" cy="1834777"/>
+          </a:xfrm>
+          <a:prstGeom prst="line">
+            <a:avLst/>
+          </a:prstGeom>
+          <a:ln w="25400">
+            <a:solidFill>
+              <a:srgbClr val="C00000"/>
+            </a:solidFill>
+          </a:ln>
+        </p:spPr>
+        <p:style>
+          <a:lnRef idx="1">
+            <a:schemeClr val="accent1"/>
+          </a:lnRef>
+          <a:fillRef idx="0">
+            <a:schemeClr val="accent1"/>
+          </a:fillRef>
+          <a:effectRef idx="0">
+            <a:schemeClr val="accent1"/>
+          </a:effectRef>
+          <a:fontRef idx="minor">
+            <a:schemeClr val="tx1"/>
+          </a:fontRef>
+        </p:style>
+      </p:cxnSp>
+      <p:sp>
+        <p:nvSpPr>
+          <p:cNvPr id="8" name="Rectangle 7"/>
+          <p:cNvSpPr/>
+          <p:nvPr/>
+        </p:nvSpPr>
+        <p:spPr>
+          <a:xfrm>
+            <a:off x="693270" y="1524000"/>
+            <a:ext cx="2498165" cy="764988"/>
+          </a:xfrm>
+          <a:prstGeom prst="rect">
+            <a:avLst/>
+          </a:prstGeom>
+          <a:solidFill>
+            <a:schemeClr val="accent5">
+              <a:lumMod val="50000"/>
+            </a:schemeClr>
+          </a:solidFill>
+        </p:spPr>
+        <p:style>
+          <a:lnRef idx="2">
+            <a:schemeClr val="accent6">
+              <a:shade val="50000"/>
+            </a:schemeClr>
+          </a:lnRef>
+          <a:fillRef idx="1">
+            <a:schemeClr val="accent6"/>
+          </a:fillRef>
+          <a:effectRef idx="0">
+            <a:schemeClr val="accent6"/>
+          </a:effectRef>
+          <a:fontRef idx="minor">
+            <a:schemeClr val="lt1"/>
+          </a:fontRef>
+        </p:style>
+        <p:txBody>
+          <a:bodyPr rtlCol="0" anchor="ctr"/>
+          <a:lstStyle/>
+          <a:p>
+            <a:pPr algn="ctr"/>
+            <a:r>
+              <a:rPr lang="en-US" dirty="0"/>
+              <a:t>Long-Running</a:t>
+            </a:r>
+          </a:p>
+          <a:p>
+            <a:pPr algn="ctr"/>
+            <a:r>
+              <a:rPr lang="en-US" dirty="0"/>
+              <a:t>Operation (LRO)</a:t>
+            </a:r>
+          </a:p>
+        </p:txBody>
+      </p:sp>
+      <p:sp>
+        <p:nvSpPr>
+          <p:cNvPr id="9" name="Rectangle 8"/>
+          <p:cNvSpPr/>
+          <p:nvPr/>
+        </p:nvSpPr>
+        <p:spPr>
+          <a:xfrm>
+            <a:off x="3191434" y="1523999"/>
+            <a:ext cx="2970305" cy="764988"/>
+          </a:xfrm>
+          <a:prstGeom prst="rect">
+            <a:avLst/>
+          </a:prstGeom>
+          <a:solidFill>
+            <a:schemeClr val="tx1"/>
+          </a:solidFill>
+          <a:ln>
+            <a:solidFill>
+              <a:schemeClr val="tx1"/>
+            </a:solidFill>
+          </a:ln>
+        </p:spPr>
+        <p:style>
+          <a:lnRef idx="2">
+            <a:schemeClr val="accent1">
+              <a:shade val="50000"/>
+            </a:schemeClr>
+          </a:lnRef>
+          <a:fillRef idx="1">
+            <a:schemeClr val="accent1"/>
+          </a:fillRef>
+          <a:effectRef idx="0">
+            <a:schemeClr val="accent1"/>
+          </a:effectRef>
+          <a:fontRef idx="minor">
+            <a:schemeClr val="lt1"/>
+          </a:fontRef>
+        </p:style>
+        <p:txBody>
+          <a:bodyPr rtlCol="0" anchor="ctr"/>
+          <a:lstStyle/>
+          <a:p>
+            <a:pPr algn="ctr"/>
+            <a:r>
+              <a:rPr lang="en-US" dirty="0"/>
+              <a:t>Suspend LRO</a:t>
+            </a:r>
+          </a:p>
+        </p:txBody>
+      </p:sp>
+      <p:cxnSp>
+        <p:nvCxnSpPr>
+          <p:cNvPr id="5" name="Straight Arrow Connector 4"/>
+          <p:cNvCxnSpPr/>
+          <p:nvPr/>
+        </p:nvCxnSpPr>
+        <p:spPr>
+          <a:xfrm flipV="1">
+            <a:off x="693270" y="2288987"/>
+            <a:ext cx="8857130" cy="1"/>
+          </a:xfrm>
+          <a:prstGeom prst="straightConnector1">
+            <a:avLst/>
+          </a:prstGeom>
+          <a:ln w="25400">
+            <a:headEnd w="lg" len="lg"/>
+            <a:tailEnd type="triangle"/>
+          </a:ln>
+        </p:spPr>
+        <p:style>
+          <a:lnRef idx="1">
+            <a:schemeClr val="dk1"/>
+          </a:lnRef>
+          <a:fillRef idx="0">
+            <a:schemeClr val="dk1"/>
+          </a:fillRef>
+          <a:effectRef idx="0">
+            <a:schemeClr val="dk1"/>
+          </a:effectRef>
+          <a:fontRef idx="minor">
+            <a:schemeClr val="tx1"/>
+          </a:fontRef>
+        </p:style>
+      </p:cxnSp>
+      <p:cxnSp>
+        <p:nvCxnSpPr>
+          <p:cNvPr id="24" name="Straight Connector 23"/>
+          <p:cNvCxnSpPr/>
+          <p:nvPr/>
+        </p:nvCxnSpPr>
+        <p:spPr>
+          <a:xfrm>
+            <a:off x="6914775" y="1045882"/>
+            <a:ext cx="0" cy="2312894"/>
+          </a:xfrm>
+          <a:prstGeom prst="line">
+            <a:avLst/>
+          </a:prstGeom>
+          <a:ln w="25400">
+            <a:solidFill>
+              <a:srgbClr val="C00000"/>
+            </a:solidFill>
+          </a:ln>
+        </p:spPr>
+        <p:style>
+          <a:lnRef idx="1">
+            <a:schemeClr val="accent1"/>
+          </a:lnRef>
+          <a:fillRef idx="0">
+            <a:schemeClr val="accent1"/>
+          </a:fillRef>
+          <a:effectRef idx="0">
+            <a:schemeClr val="accent1"/>
+          </a:effectRef>
+          <a:fontRef idx="minor">
+            <a:schemeClr val="tx1"/>
+          </a:fontRef>
+        </p:style>
+      </p:cxnSp>
+      <p:cxnSp>
+        <p:nvCxnSpPr>
+          <p:cNvPr id="26" name="Straight Connector 25"/>
+          <p:cNvCxnSpPr/>
+          <p:nvPr/>
+        </p:nvCxnSpPr>
+        <p:spPr>
+          <a:xfrm>
+            <a:off x="8211670" y="1045882"/>
+            <a:ext cx="0" cy="2312894"/>
+          </a:xfrm>
+          <a:prstGeom prst="line">
+            <a:avLst/>
+          </a:prstGeom>
+          <a:ln w="25400">
+            <a:solidFill>
+              <a:srgbClr val="C00000"/>
+            </a:solidFill>
+          </a:ln>
+        </p:spPr>
+        <p:style>
+          <a:lnRef idx="1">
+            <a:schemeClr val="accent1"/>
+          </a:lnRef>
+          <a:fillRef idx="0">
+            <a:schemeClr val="accent1"/>
+          </a:fillRef>
+          <a:effectRef idx="0">
+            <a:schemeClr val="accent1"/>
+          </a:effectRef>
+          <a:fontRef idx="minor">
+            <a:schemeClr val="tx1"/>
+          </a:fontRef>
+        </p:style>
+      </p:cxnSp>
+      <p:sp>
+        <p:nvSpPr>
+          <p:cNvPr id="10" name="Rectangle 9"/>
+          <p:cNvSpPr/>
+          <p:nvPr/>
+        </p:nvSpPr>
+        <p:spPr>
+          <a:xfrm>
+            <a:off x="6161741" y="1523999"/>
+            <a:ext cx="2049929" cy="764988"/>
+          </a:xfrm>
+          <a:prstGeom prst="rect">
+            <a:avLst/>
+          </a:prstGeom>
+          <a:solidFill>
+            <a:schemeClr val="accent5">
+              <a:lumMod val="50000"/>
+            </a:schemeClr>
+          </a:solidFill>
+          <a:ln>
+            <a:solidFill>
+              <a:schemeClr val="accent5">
+                <a:lumMod val="50000"/>
+              </a:schemeClr>
+            </a:solidFill>
+          </a:ln>
+        </p:spPr>
+        <p:style>
+          <a:lnRef idx="2">
+            <a:schemeClr val="accent6">
+              <a:shade val="50000"/>
+            </a:schemeClr>
+          </a:lnRef>
+          <a:fillRef idx="1">
+            <a:schemeClr val="accent6"/>
+          </a:fillRef>
+          <a:effectRef idx="0">
+            <a:schemeClr val="accent6"/>
+          </a:effectRef>
+          <a:fontRef idx="minor">
+            <a:schemeClr val="lt1"/>
+          </a:fontRef>
+        </p:style>
+        <p:txBody>
+          <a:bodyPr rtlCol="0" anchor="ctr"/>
+          <a:lstStyle/>
+          <a:p>
+            <a:pPr algn="ctr"/>
+            <a:r>
+              <a:rPr lang="en-US" dirty="0"/>
+              <a:t>Resume LRO</a:t>
+            </a:r>
+          </a:p>
+        </p:txBody>
+      </p:sp>
+      <p:cxnSp>
+        <p:nvCxnSpPr>
+          <p:cNvPr id="29" name="Straight Arrow Connector 28"/>
+          <p:cNvCxnSpPr/>
+          <p:nvPr/>
+        </p:nvCxnSpPr>
+        <p:spPr>
+          <a:xfrm flipV="1">
+            <a:off x="1897529" y="3137647"/>
+            <a:ext cx="1287929" cy="5977"/>
+          </a:xfrm>
+          <a:prstGeom prst="straightConnector1">
+            <a:avLst/>
+          </a:prstGeom>
+          <a:ln>
+            <a:headEnd type="triangle"/>
+            <a:tailEnd type="triangle"/>
+          </a:ln>
+        </p:spPr>
+        <p:style>
+          <a:lnRef idx="1">
+            <a:schemeClr val="dk1"/>
+          </a:lnRef>
+          <a:fillRef idx="0">
+            <a:schemeClr val="dk1"/>
+          </a:fillRef>
+          <a:effectRef idx="0">
+            <a:schemeClr val="dk1"/>
+          </a:effectRef>
+          <a:fontRef idx="minor">
+            <a:schemeClr val="tx1"/>
+          </a:fontRef>
+        </p:style>
+      </p:cxnSp>
+      <p:sp>
+        <p:nvSpPr>
+          <p:cNvPr id="31" name="Rectangle 30"/>
+          <p:cNvSpPr/>
+          <p:nvPr/>
+        </p:nvSpPr>
+        <p:spPr>
+          <a:xfrm>
+            <a:off x="2088777" y="2516092"/>
+            <a:ext cx="914400" cy="537883"/>
+          </a:xfrm>
+          <a:prstGeom prst="rect">
+            <a:avLst/>
+          </a:prstGeom>
+          <a:solidFill>
+            <a:schemeClr val="bg1"/>
+          </a:solidFill>
+          <a:ln>
+            <a:solidFill>
+              <a:schemeClr val="tx2"/>
+            </a:solidFill>
+          </a:ln>
+        </p:spPr>
+        <p:style>
+          <a:lnRef idx="2">
+            <a:schemeClr val="accent6"/>
+          </a:lnRef>
+          <a:fillRef idx="1">
+            <a:schemeClr val="lt1"/>
+          </a:fillRef>
+          <a:effectRef idx="0">
+            <a:schemeClr val="accent6"/>
+          </a:effectRef>
+          <a:fontRef idx="minor">
+            <a:schemeClr val="dk1"/>
+          </a:fontRef>
+        </p:style>
+        <p:txBody>
+          <a:bodyPr rtlCol="0" anchor="ctr"/>
+          <a:lstStyle/>
+          <a:p>
+            <a:pPr algn="ctr"/>
+            <a:r>
+              <a:rPr lang="en-US" sz="1100" b="1" dirty="0"/>
+              <a:t>Maximum checkpoint distance</a:t>
+            </a:r>
+          </a:p>
+        </p:txBody>
+      </p:sp>
+      <p:cxnSp>
+        <p:nvCxnSpPr>
+          <p:cNvPr id="35" name="Straight Arrow Connector 34"/>
+          <p:cNvCxnSpPr/>
+          <p:nvPr/>
+        </p:nvCxnSpPr>
+        <p:spPr>
+          <a:xfrm>
+            <a:off x="3194424" y="1356659"/>
+            <a:ext cx="2967315" cy="0"/>
+          </a:xfrm>
+          <a:prstGeom prst="straightConnector1">
+            <a:avLst/>
+          </a:prstGeom>
+          <a:ln>
+            <a:solidFill>
+              <a:schemeClr val="tx1"/>
+            </a:solidFill>
+            <a:headEnd type="triangle"/>
+            <a:tailEnd type="triangle"/>
+          </a:ln>
+        </p:spPr>
+        <p:style>
+          <a:lnRef idx="1">
+            <a:schemeClr val="accent1"/>
+          </a:lnRef>
+          <a:fillRef idx="0">
+            <a:schemeClr val="accent1"/>
+          </a:fillRef>
+          <a:effectRef idx="0">
+            <a:schemeClr val="accent1"/>
+          </a:effectRef>
+          <a:fontRef idx="minor">
+            <a:schemeClr val="tx1"/>
+          </a:fontRef>
+        </p:style>
+      </p:cxnSp>
+    </p:spTree>
+    <p:extLst>
+      <p:ext uri="{BB962C8B-B14F-4D97-AF65-F5344CB8AC3E}">
+        <p14:creationId xmlns:p14="http://schemas.microsoft.com/office/powerpoint/2010/main" val="1972854566"/>
+      </p:ext>
+    </p:extLst>
+  </p:cSld>
+  <p:clrMapOvr>
+    <a:masterClrMapping/>
+  </p:clrMapOvr>
+</p:sld>
+</file>
+
 <file path=ppt/theme/theme1.xml><?xml version="1.0" encoding="utf-8"?>
 <a:theme xmlns:a="http://schemas.openxmlformats.org/drawingml/2006/main" name="Office Theme">
   <a:themeElements>

</xml_diff>

<commit_message>
Updated sensor, actuator modeling writeup
</commit_message>
<xml_diff>
--- a/src/img/source-2.pptx
+++ b/src/img/source-2.pptx
@@ -8,6 +8,7 @@
     <p:sldId id="256" r:id="rId2"/>
     <p:sldId id="257" r:id="rId3"/>
     <p:sldId id="258" r:id="rId4"/>
+    <p:sldId id="259" r:id="rId5"/>
   </p:sldIdLst>
   <p:sldSz cx="12192000" cy="6858000"/>
   <p:notesSz cx="6858000" cy="9144000"/>
@@ -243,7 +244,7 @@
           <a:p>
             <a:fld id="{E1F60DCA-AAD4-4732-9BAD-8406E14A866C}" type="datetimeFigureOut">
               <a:rPr lang="en-US" smtClean="0"/>
-              <a:t>5/9/2016</a:t>
+              <a:t>5/17/2016</a:t>
             </a:fld>
             <a:endParaRPr lang="en-US" dirty="0"/>
           </a:p>
@@ -411,7 +412,7 @@
           <a:p>
             <a:fld id="{E1F60DCA-AAD4-4732-9BAD-8406E14A866C}" type="datetimeFigureOut">
               <a:rPr lang="en-US" smtClean="0"/>
-              <a:t>5/9/2016</a:t>
+              <a:t>5/17/2016</a:t>
             </a:fld>
             <a:endParaRPr lang="en-US" dirty="0"/>
           </a:p>
@@ -589,7 +590,7 @@
           <a:p>
             <a:fld id="{E1F60DCA-AAD4-4732-9BAD-8406E14A866C}" type="datetimeFigureOut">
               <a:rPr lang="en-US" smtClean="0"/>
-              <a:t>5/9/2016</a:t>
+              <a:t>5/17/2016</a:t>
             </a:fld>
             <a:endParaRPr lang="en-US" dirty="0"/>
           </a:p>
@@ -757,7 +758,7 @@
           <a:p>
             <a:fld id="{E1F60DCA-AAD4-4732-9BAD-8406E14A866C}" type="datetimeFigureOut">
               <a:rPr lang="en-US" smtClean="0"/>
-              <a:t>5/9/2016</a:t>
+              <a:t>5/17/2016</a:t>
             </a:fld>
             <a:endParaRPr lang="en-US" dirty="0"/>
           </a:p>
@@ -1002,7 +1003,7 @@
           <a:p>
             <a:fld id="{E1F60DCA-AAD4-4732-9BAD-8406E14A866C}" type="datetimeFigureOut">
               <a:rPr lang="en-US" smtClean="0"/>
-              <a:t>5/9/2016</a:t>
+              <a:t>5/17/2016</a:t>
             </a:fld>
             <a:endParaRPr lang="en-US" dirty="0"/>
           </a:p>
@@ -1231,7 +1232,7 @@
           <a:p>
             <a:fld id="{E1F60DCA-AAD4-4732-9BAD-8406E14A866C}" type="datetimeFigureOut">
               <a:rPr lang="en-US" smtClean="0"/>
-              <a:t>5/9/2016</a:t>
+              <a:t>5/17/2016</a:t>
             </a:fld>
             <a:endParaRPr lang="en-US" dirty="0"/>
           </a:p>
@@ -1595,7 +1596,7 @@
           <a:p>
             <a:fld id="{E1F60DCA-AAD4-4732-9BAD-8406E14A866C}" type="datetimeFigureOut">
               <a:rPr lang="en-US" smtClean="0"/>
-              <a:t>5/9/2016</a:t>
+              <a:t>5/17/2016</a:t>
             </a:fld>
             <a:endParaRPr lang="en-US" dirty="0"/>
           </a:p>
@@ -1712,7 +1713,7 @@
           <a:p>
             <a:fld id="{E1F60DCA-AAD4-4732-9BAD-8406E14A866C}" type="datetimeFigureOut">
               <a:rPr lang="en-US" smtClean="0"/>
-              <a:t>5/9/2016</a:t>
+              <a:t>5/17/2016</a:t>
             </a:fld>
             <a:endParaRPr lang="en-US" dirty="0"/>
           </a:p>
@@ -1807,7 +1808,7 @@
           <a:p>
             <a:fld id="{E1F60DCA-AAD4-4732-9BAD-8406E14A866C}" type="datetimeFigureOut">
               <a:rPr lang="en-US" smtClean="0"/>
-              <a:t>5/9/2016</a:t>
+              <a:t>5/17/2016</a:t>
             </a:fld>
             <a:endParaRPr lang="en-US" dirty="0"/>
           </a:p>
@@ -2082,7 +2083,7 @@
           <a:p>
             <a:fld id="{E1F60DCA-AAD4-4732-9BAD-8406E14A866C}" type="datetimeFigureOut">
               <a:rPr lang="en-US" smtClean="0"/>
-              <a:t>5/9/2016</a:t>
+              <a:t>5/17/2016</a:t>
             </a:fld>
             <a:endParaRPr lang="en-US" dirty="0"/>
           </a:p>
@@ -2334,7 +2335,7 @@
           <a:p>
             <a:fld id="{E1F60DCA-AAD4-4732-9BAD-8406E14A866C}" type="datetimeFigureOut">
               <a:rPr lang="en-US" smtClean="0"/>
-              <a:t>5/9/2016</a:t>
+              <a:t>5/17/2016</a:t>
             </a:fld>
             <a:endParaRPr lang="en-US" dirty="0"/>
           </a:p>
@@ -2545,7 +2546,7 @@
           <a:p>
             <a:fld id="{E1F60DCA-AAD4-4732-9BAD-8406E14A866C}" type="datetimeFigureOut">
               <a:rPr lang="en-US" smtClean="0"/>
-              <a:t>5/9/2016</a:t>
+              <a:t>5/17/2016</a:t>
             </a:fld>
             <a:endParaRPr lang="en-US" dirty="0"/>
           </a:p>
@@ -3854,6 +3855,157 @@
 </p:sld>
 </file>
 
+<file path=ppt/slides/slide4.xml><?xml version="1.0" encoding="utf-8"?>
+<p:sld xmlns:a="http://schemas.openxmlformats.org/drawingml/2006/main" xmlns:r="http://schemas.openxmlformats.org/officeDocument/2006/relationships" xmlns:p="http://schemas.openxmlformats.org/presentationml/2006/main">
+  <p:cSld>
+    <p:spTree>
+      <p:nvGrpSpPr>
+        <p:cNvPr id="1" name=""/>
+        <p:cNvGrpSpPr/>
+        <p:nvPr/>
+      </p:nvGrpSpPr>
+      <p:grpSpPr>
+        <a:xfrm>
+          <a:off x="0" y="0"/>
+          <a:ext cx="0" cy="0"/>
+          <a:chOff x="0" y="0"/>
+          <a:chExt cx="0" cy="0"/>
+        </a:xfrm>
+      </p:grpSpPr>
+      <p:sp>
+        <p:nvSpPr>
+          <p:cNvPr id="2" name="Title 1"/>
+          <p:cNvSpPr>
+            <a:spLocks noGrp="1"/>
+          </p:cNvSpPr>
+          <p:nvPr>
+            <p:ph type="title"/>
+          </p:nvPr>
+        </p:nvSpPr>
+        <p:spPr/>
+        <p:txBody>
+          <a:bodyPr/>
+          <a:lstStyle/>
+          <a:p>
+            <a:endParaRPr lang="en-US"/>
+          </a:p>
+        </p:txBody>
+      </p:sp>
+      <p:pic>
+        <p:nvPicPr>
+          <p:cNvPr id="4" name="Picture 3"/>
+          <p:cNvPicPr>
+            <a:picLocks noChangeAspect="1"/>
+          </p:cNvPicPr>
+          <p:nvPr/>
+        </p:nvPicPr>
+        <p:blipFill>
+          <a:blip r:embed="rId2">
+            <a:extLst>
+              <a:ext uri="{28A0092B-C50C-407E-A947-70E740481C1C}">
+                <a14:useLocalDpi xmlns:a14="http://schemas.microsoft.com/office/drawing/2010/main" val="0"/>
+              </a:ext>
+            </a:extLst>
+          </a:blip>
+          <a:stretch>
+            <a:fillRect/>
+          </a:stretch>
+        </p:blipFill>
+        <p:spPr>
+          <a:xfrm>
+            <a:off x="2510339" y="2195518"/>
+            <a:ext cx="9352249" cy="3542678"/>
+          </a:xfrm>
+          <a:prstGeom prst="rect">
+            <a:avLst/>
+          </a:prstGeom>
+        </p:spPr>
+      </p:pic>
+      <p:sp>
+        <p:nvSpPr>
+          <p:cNvPr id="5" name="Striped Right Arrow 4"/>
+          <p:cNvSpPr/>
+          <p:nvPr/>
+        </p:nvSpPr>
+        <p:spPr>
+          <a:xfrm rot="10800000">
+            <a:off x="1408517" y="2936304"/>
+            <a:ext cx="1187016" cy="1192695"/>
+          </a:xfrm>
+          <a:prstGeom prst="stripedRightArrow">
+            <a:avLst/>
+          </a:prstGeom>
+        </p:spPr>
+        <p:style>
+          <a:lnRef idx="2">
+            <a:schemeClr val="dk1">
+              <a:shade val="50000"/>
+            </a:schemeClr>
+          </a:lnRef>
+          <a:fillRef idx="1">
+            <a:schemeClr val="dk1"/>
+          </a:fillRef>
+          <a:effectRef idx="0">
+            <a:schemeClr val="dk1"/>
+          </a:effectRef>
+          <a:fontRef idx="minor">
+            <a:schemeClr val="lt1"/>
+          </a:fontRef>
+        </p:style>
+        <p:txBody>
+          <a:bodyPr rtlCol="0" anchor="ctr"/>
+          <a:lstStyle/>
+          <a:p>
+            <a:pPr algn="ctr"/>
+            <a:endParaRPr lang="en-US"/>
+          </a:p>
+        </p:txBody>
+      </p:sp>
+      <p:sp>
+        <p:nvSpPr>
+          <p:cNvPr id="6" name="TextBox 5"/>
+          <p:cNvSpPr txBox="1"/>
+          <p:nvPr/>
+        </p:nvSpPr>
+        <p:spPr>
+          <a:xfrm>
+            <a:off x="1155779" y="4129000"/>
+            <a:ext cx="2138333" cy="369332"/>
+          </a:xfrm>
+          <a:prstGeom prst="rect">
+            <a:avLst/>
+          </a:prstGeom>
+          <a:noFill/>
+        </p:spPr>
+        <p:txBody>
+          <a:bodyPr wrap="square" rtlCol="0">
+            <a:spAutoFit/>
+          </a:bodyPr>
+          <a:lstStyle/>
+          <a:p>
+            <a:r>
+              <a:rPr lang="en-US" b="1" dirty="0">
+                <a:latin typeface="Courier New" panose="02070309020205020404" pitchFamily="49" charset="0"/>
+                <a:cs typeface="Courier New" panose="02070309020205020404" pitchFamily="49" charset="0"/>
+              </a:rPr>
+              <a:t>Execute_Thread</a:t>
+            </a:r>
+          </a:p>
+        </p:txBody>
+      </p:sp>
+    </p:spTree>
+    <p:extLst>
+      <p:ext uri="{BB962C8B-B14F-4D97-AF65-F5344CB8AC3E}">
+        <p14:creationId xmlns:p14="http://schemas.microsoft.com/office/powerpoint/2010/main" val="3889325517"/>
+      </p:ext>
+    </p:extLst>
+  </p:cSld>
+  <p:clrMapOvr>
+    <a:masterClrMapping/>
+  </p:clrMapOvr>
+</p:sld>
+</file>
+
 <file path=ppt/theme/theme1.xml><?xml version="1.0" encoding="utf-8"?>
 <a:theme xmlns:a="http://schemas.openxmlformats.org/drawingml/2006/main" name="Office Theme">
   <a:themeElements>

</xml_diff>

<commit_message>
Updated dissertation with KSP results and tables
</commit_message>
<xml_diff>
--- a/src/img/source-2.pptx
+++ b/src/img/source-2.pptx
@@ -9,6 +9,10 @@
     <p:sldId id="257" r:id="rId3"/>
     <p:sldId id="258" r:id="rId4"/>
     <p:sldId id="259" r:id="rId5"/>
+    <p:sldId id="261" r:id="rId6"/>
+    <p:sldId id="263" r:id="rId7"/>
+    <p:sldId id="262" r:id="rId8"/>
+    <p:sldId id="264" r:id="rId9"/>
   </p:sldIdLst>
   <p:sldSz cx="12192000" cy="6858000"/>
   <p:notesSz cx="6858000" cy="9144000"/>
@@ -244,7 +248,7 @@
           <a:p>
             <a:fld id="{E1F60DCA-AAD4-4732-9BAD-8406E14A866C}" type="datetimeFigureOut">
               <a:rPr lang="en-US" smtClean="0"/>
-              <a:t>5/17/2016</a:t>
+              <a:t>5/20/2016</a:t>
             </a:fld>
             <a:endParaRPr lang="en-US" dirty="0"/>
           </a:p>
@@ -412,7 +416,7 @@
           <a:p>
             <a:fld id="{E1F60DCA-AAD4-4732-9BAD-8406E14A866C}" type="datetimeFigureOut">
               <a:rPr lang="en-US" smtClean="0"/>
-              <a:t>5/17/2016</a:t>
+              <a:t>5/20/2016</a:t>
             </a:fld>
             <a:endParaRPr lang="en-US" dirty="0"/>
           </a:p>
@@ -590,7 +594,7 @@
           <a:p>
             <a:fld id="{E1F60DCA-AAD4-4732-9BAD-8406E14A866C}" type="datetimeFigureOut">
               <a:rPr lang="en-US" smtClean="0"/>
-              <a:t>5/17/2016</a:t>
+              <a:t>5/20/2016</a:t>
             </a:fld>
             <a:endParaRPr lang="en-US" dirty="0"/>
           </a:p>
@@ -758,7 +762,7 @@
           <a:p>
             <a:fld id="{E1F60DCA-AAD4-4732-9BAD-8406E14A866C}" type="datetimeFigureOut">
               <a:rPr lang="en-US" smtClean="0"/>
-              <a:t>5/17/2016</a:t>
+              <a:t>5/20/2016</a:t>
             </a:fld>
             <a:endParaRPr lang="en-US" dirty="0"/>
           </a:p>
@@ -1003,7 +1007,7 @@
           <a:p>
             <a:fld id="{E1F60DCA-AAD4-4732-9BAD-8406E14A866C}" type="datetimeFigureOut">
               <a:rPr lang="en-US" smtClean="0"/>
-              <a:t>5/17/2016</a:t>
+              <a:t>5/20/2016</a:t>
             </a:fld>
             <a:endParaRPr lang="en-US" dirty="0"/>
           </a:p>
@@ -1232,7 +1236,7 @@
           <a:p>
             <a:fld id="{E1F60DCA-AAD4-4732-9BAD-8406E14A866C}" type="datetimeFigureOut">
               <a:rPr lang="en-US" smtClean="0"/>
-              <a:t>5/17/2016</a:t>
+              <a:t>5/20/2016</a:t>
             </a:fld>
             <a:endParaRPr lang="en-US" dirty="0"/>
           </a:p>
@@ -1596,7 +1600,7 @@
           <a:p>
             <a:fld id="{E1F60DCA-AAD4-4732-9BAD-8406E14A866C}" type="datetimeFigureOut">
               <a:rPr lang="en-US" smtClean="0"/>
-              <a:t>5/17/2016</a:t>
+              <a:t>5/20/2016</a:t>
             </a:fld>
             <a:endParaRPr lang="en-US" dirty="0"/>
           </a:p>
@@ -1713,7 +1717,7 @@
           <a:p>
             <a:fld id="{E1F60DCA-AAD4-4732-9BAD-8406E14A866C}" type="datetimeFigureOut">
               <a:rPr lang="en-US" smtClean="0"/>
-              <a:t>5/17/2016</a:t>
+              <a:t>5/20/2016</a:t>
             </a:fld>
             <a:endParaRPr lang="en-US" dirty="0"/>
           </a:p>
@@ -1808,7 +1812,7 @@
           <a:p>
             <a:fld id="{E1F60DCA-AAD4-4732-9BAD-8406E14A866C}" type="datetimeFigureOut">
               <a:rPr lang="en-US" smtClean="0"/>
-              <a:t>5/17/2016</a:t>
+              <a:t>5/20/2016</a:t>
             </a:fld>
             <a:endParaRPr lang="en-US" dirty="0"/>
           </a:p>
@@ -2083,7 +2087,7 @@
           <a:p>
             <a:fld id="{E1F60DCA-AAD4-4732-9BAD-8406E14A866C}" type="datetimeFigureOut">
               <a:rPr lang="en-US" smtClean="0"/>
-              <a:t>5/17/2016</a:t>
+              <a:t>5/20/2016</a:t>
             </a:fld>
             <a:endParaRPr lang="en-US" dirty="0"/>
           </a:p>
@@ -2335,7 +2339,7 @@
           <a:p>
             <a:fld id="{E1F60DCA-AAD4-4732-9BAD-8406E14A866C}" type="datetimeFigureOut">
               <a:rPr lang="en-US" smtClean="0"/>
-              <a:t>5/17/2016</a:t>
+              <a:t>5/20/2016</a:t>
             </a:fld>
             <a:endParaRPr lang="en-US" dirty="0"/>
           </a:p>
@@ -2546,7 +2550,7 @@
           <a:p>
             <a:fld id="{E1F60DCA-AAD4-4732-9BAD-8406E14A866C}" type="datetimeFigureOut">
               <a:rPr lang="en-US" smtClean="0"/>
-              <a:t>5/17/2016</a:t>
+              <a:t>5/20/2016</a:t>
             </a:fld>
             <a:endParaRPr lang="en-US" dirty="0"/>
           </a:p>
@@ -4006,6 +4010,918 @@
 </p:sld>
 </file>
 
+<file path=ppt/slides/slide5.xml><?xml version="1.0" encoding="utf-8"?>
+<p:sld xmlns:a="http://schemas.openxmlformats.org/drawingml/2006/main" xmlns:r="http://schemas.openxmlformats.org/officeDocument/2006/relationships" xmlns:p="http://schemas.openxmlformats.org/presentationml/2006/main">
+  <p:cSld>
+    <p:spTree>
+      <p:nvGrpSpPr>
+        <p:cNvPr id="1" name=""/>
+        <p:cNvGrpSpPr/>
+        <p:nvPr/>
+      </p:nvGrpSpPr>
+      <p:grpSpPr>
+        <a:xfrm>
+          <a:off x="0" y="0"/>
+          <a:ext cx="0" cy="0"/>
+          <a:chOff x="0" y="0"/>
+          <a:chExt cx="0" cy="0"/>
+        </a:xfrm>
+      </p:grpSpPr>
+      <p:pic>
+        <p:nvPicPr>
+          <p:cNvPr id="4" name="Picture 3"/>
+          <p:cNvPicPr>
+            <a:picLocks noChangeAspect="1"/>
+          </p:cNvPicPr>
+          <p:nvPr/>
+        </p:nvPicPr>
+        <p:blipFill>
+          <a:blip r:embed="rId2">
+            <a:extLst>
+              <a:ext uri="{28A0092B-C50C-407E-A947-70E740481C1C}">
+                <a14:useLocalDpi xmlns:a14="http://schemas.microsoft.com/office/drawing/2010/main" val="0"/>
+              </a:ext>
+            </a:extLst>
+          </a:blip>
+          <a:stretch>
+            <a:fillRect/>
+          </a:stretch>
+        </p:blipFill>
+        <p:spPr>
+          <a:xfrm>
+            <a:off x="703024" y="841134"/>
+            <a:ext cx="10741489" cy="5570800"/>
+          </a:xfrm>
+          <a:prstGeom prst="rect">
+            <a:avLst/>
+          </a:prstGeom>
+        </p:spPr>
+      </p:pic>
+      <p:pic>
+        <p:nvPicPr>
+          <p:cNvPr id="2" name="Picture 1"/>
+          <p:cNvPicPr>
+            <a:picLocks noChangeAspect="1"/>
+          </p:cNvPicPr>
+          <p:nvPr/>
+        </p:nvPicPr>
+        <p:blipFill>
+          <a:blip r:embed="rId3"/>
+          <a:stretch>
+            <a:fillRect/>
+          </a:stretch>
+        </p:blipFill>
+        <p:spPr>
+          <a:xfrm>
+            <a:off x="3535812" y="606319"/>
+            <a:ext cx="7908701" cy="3204122"/>
+          </a:xfrm>
+          <a:prstGeom prst="rect">
+            <a:avLst/>
+          </a:prstGeom>
+        </p:spPr>
+      </p:pic>
+      <p:sp>
+        <p:nvSpPr>
+          <p:cNvPr id="3" name="Rectangle 2"/>
+          <p:cNvSpPr/>
+          <p:nvPr/>
+        </p:nvSpPr>
+        <p:spPr>
+          <a:xfrm>
+            <a:off x="3481536" y="660400"/>
+            <a:ext cx="7894510" cy="3076713"/>
+          </a:xfrm>
+          <a:prstGeom prst="rect">
+            <a:avLst/>
+          </a:prstGeom>
+          <a:noFill/>
+          <a:ln w="38100">
+            <a:solidFill>
+              <a:schemeClr val="tx1"/>
+            </a:solidFill>
+          </a:ln>
+        </p:spPr>
+        <p:style>
+          <a:lnRef idx="2">
+            <a:schemeClr val="accent1">
+              <a:shade val="50000"/>
+            </a:schemeClr>
+          </a:lnRef>
+          <a:fillRef idx="1">
+            <a:schemeClr val="accent1"/>
+          </a:fillRef>
+          <a:effectRef idx="0">
+            <a:schemeClr val="accent1"/>
+          </a:effectRef>
+          <a:fontRef idx="minor">
+            <a:schemeClr val="lt1"/>
+          </a:fontRef>
+        </p:style>
+        <p:txBody>
+          <a:bodyPr rtlCol="0" anchor="ctr"/>
+          <a:lstStyle/>
+          <a:p>
+            <a:pPr algn="ctr"/>
+            <a:endParaRPr lang="en-US"/>
+          </a:p>
+        </p:txBody>
+      </p:sp>
+      <p:sp>
+        <p:nvSpPr>
+          <p:cNvPr id="8" name="Rectangle 7"/>
+          <p:cNvSpPr/>
+          <p:nvPr/>
+        </p:nvSpPr>
+        <p:spPr>
+          <a:xfrm>
+            <a:off x="3684105" y="3864522"/>
+            <a:ext cx="7489372" cy="1052286"/>
+          </a:xfrm>
+          <a:prstGeom prst="rect">
+            <a:avLst/>
+          </a:prstGeom>
+          <a:solidFill>
+            <a:schemeClr val="accent1">
+              <a:alpha val="50000"/>
+            </a:schemeClr>
+          </a:solidFill>
+          <a:ln>
+            <a:noFill/>
+          </a:ln>
+        </p:spPr>
+        <p:style>
+          <a:lnRef idx="0">
+            <a:scrgbClr r="0" g="0" b="0"/>
+          </a:lnRef>
+          <a:fillRef idx="0">
+            <a:scrgbClr r="0" g="0" b="0"/>
+          </a:fillRef>
+          <a:effectRef idx="0">
+            <a:scrgbClr r="0" g="0" b="0"/>
+          </a:effectRef>
+          <a:fontRef idx="minor">
+            <a:schemeClr val="lt1"/>
+          </a:fontRef>
+        </p:style>
+        <p:txBody>
+          <a:bodyPr rtlCol="0" anchor="ctr"/>
+          <a:lstStyle/>
+          <a:p>
+            <a:pPr algn="ctr"/>
+            <a:r>
+              <a:rPr lang="en-US" sz="3200" dirty="0">
+                <a:solidFill>
+                  <a:schemeClr val="bg1"/>
+                </a:solidFill>
+              </a:rPr>
+              <a:t>kRPC Interface Layer</a:t>
+            </a:r>
+          </a:p>
+        </p:txBody>
+      </p:sp>
+    </p:spTree>
+    <p:extLst>
+      <p:ext uri="{BB962C8B-B14F-4D97-AF65-F5344CB8AC3E}">
+        <p14:creationId xmlns:p14="http://schemas.microsoft.com/office/powerpoint/2010/main" val="3376262305"/>
+      </p:ext>
+    </p:extLst>
+  </p:cSld>
+  <p:clrMapOvr>
+    <a:masterClrMapping/>
+  </p:clrMapOvr>
+</p:sld>
+</file>
+
+<file path=ppt/slides/slide6.xml><?xml version="1.0" encoding="utf-8"?>
+<p:sld xmlns:a="http://schemas.openxmlformats.org/drawingml/2006/main" xmlns:r="http://schemas.openxmlformats.org/officeDocument/2006/relationships" xmlns:p="http://schemas.openxmlformats.org/presentationml/2006/main">
+  <p:cSld>
+    <p:spTree>
+      <p:nvGrpSpPr>
+        <p:cNvPr id="1" name=""/>
+        <p:cNvGrpSpPr/>
+        <p:nvPr/>
+      </p:nvGrpSpPr>
+      <p:grpSpPr>
+        <a:xfrm>
+          <a:off x="0" y="0"/>
+          <a:ext cx="0" cy="0"/>
+          <a:chOff x="0" y="0"/>
+          <a:chExt cx="0" cy="0"/>
+        </a:xfrm>
+      </p:grpSpPr>
+      <p:sp>
+        <p:nvSpPr>
+          <p:cNvPr id="2" name="Title 1"/>
+          <p:cNvSpPr>
+            <a:spLocks noGrp="1"/>
+          </p:cNvSpPr>
+          <p:nvPr>
+            <p:ph type="title"/>
+          </p:nvPr>
+        </p:nvSpPr>
+        <p:spPr/>
+        <p:txBody>
+          <a:bodyPr/>
+          <a:lstStyle/>
+          <a:p>
+            <a:endParaRPr lang="en-US"/>
+          </a:p>
+        </p:txBody>
+      </p:sp>
+      <p:pic>
+        <p:nvPicPr>
+          <p:cNvPr id="5" name="Picture 4"/>
+          <p:cNvPicPr>
+            <a:picLocks noChangeAspect="1"/>
+          </p:cNvPicPr>
+          <p:nvPr/>
+        </p:nvPicPr>
+        <p:blipFill>
+          <a:blip r:embed="rId2">
+            <a:extLst>
+              <a:ext uri="{28A0092B-C50C-407E-A947-70E740481C1C}">
+                <a14:useLocalDpi xmlns:a14="http://schemas.microsoft.com/office/drawing/2010/main" val="0"/>
+              </a:ext>
+            </a:extLst>
+          </a:blip>
+          <a:stretch>
+            <a:fillRect/>
+          </a:stretch>
+        </p:blipFill>
+        <p:spPr>
+          <a:xfrm>
+            <a:off x="818413" y="2061100"/>
+            <a:ext cx="10555173" cy="3853400"/>
+          </a:xfrm>
+          <a:prstGeom prst="rect">
+            <a:avLst/>
+          </a:prstGeom>
+        </p:spPr>
+      </p:pic>
+      <p:sp>
+        <p:nvSpPr>
+          <p:cNvPr id="8" name="Rectangle 7"/>
+          <p:cNvSpPr/>
+          <p:nvPr/>
+        </p:nvSpPr>
+        <p:spPr>
+          <a:xfrm>
+            <a:off x="838200" y="2061100"/>
+            <a:ext cx="3523343" cy="1995643"/>
+          </a:xfrm>
+          <a:prstGeom prst="rect">
+            <a:avLst/>
+          </a:prstGeom>
+          <a:noFill/>
+          <a:ln w="25400">
+            <a:solidFill>
+              <a:schemeClr val="tx1"/>
+            </a:solidFill>
+          </a:ln>
+        </p:spPr>
+        <p:style>
+          <a:lnRef idx="2">
+            <a:schemeClr val="accent1">
+              <a:shade val="50000"/>
+            </a:schemeClr>
+          </a:lnRef>
+          <a:fillRef idx="1">
+            <a:schemeClr val="accent1"/>
+          </a:fillRef>
+          <a:effectRef idx="0">
+            <a:schemeClr val="accent1"/>
+          </a:effectRef>
+          <a:fontRef idx="minor">
+            <a:schemeClr val="lt1"/>
+          </a:fontRef>
+        </p:style>
+        <p:txBody>
+          <a:bodyPr rtlCol="0" anchor="ctr"/>
+          <a:lstStyle/>
+          <a:p>
+            <a:pPr algn="ctr"/>
+            <a:endParaRPr lang="en-US" b="1" dirty="0">
+              <a:solidFill>
+                <a:srgbClr val="C00000"/>
+              </a:solidFill>
+            </a:endParaRPr>
+          </a:p>
+          <a:p>
+            <a:pPr algn="ctr"/>
+            <a:endParaRPr lang="en-US" b="1" dirty="0">
+              <a:solidFill>
+                <a:srgbClr val="C00000"/>
+              </a:solidFill>
+            </a:endParaRPr>
+          </a:p>
+          <a:p>
+            <a:pPr algn="ctr"/>
+            <a:endParaRPr lang="en-US" b="1" dirty="0">
+              <a:solidFill>
+                <a:srgbClr val="C00000"/>
+              </a:solidFill>
+            </a:endParaRPr>
+          </a:p>
+          <a:p>
+            <a:pPr algn="ctr"/>
+            <a:endParaRPr lang="en-US" b="1" dirty="0">
+              <a:solidFill>
+                <a:srgbClr val="C00000"/>
+              </a:solidFill>
+            </a:endParaRPr>
+          </a:p>
+          <a:p>
+            <a:pPr algn="ctr"/>
+            <a:endParaRPr lang="en-US" b="1" dirty="0">
+              <a:solidFill>
+                <a:srgbClr val="C00000"/>
+              </a:solidFill>
+            </a:endParaRPr>
+          </a:p>
+          <a:p>
+            <a:pPr algn="ctr"/>
+            <a:endParaRPr lang="en-US" b="1" dirty="0">
+              <a:solidFill>
+                <a:srgbClr val="C00000"/>
+              </a:solidFill>
+            </a:endParaRPr>
+          </a:p>
+          <a:p>
+            <a:pPr algn="ctr"/>
+            <a:r>
+              <a:rPr lang="en-US" b="1" dirty="0">
+                <a:solidFill>
+                  <a:srgbClr val="C00000"/>
+                </a:solidFill>
+              </a:rPr>
+              <a:t>Sensor I/O component</a:t>
+            </a:r>
+          </a:p>
+        </p:txBody>
+      </p:sp>
+      <p:sp>
+        <p:nvSpPr>
+          <p:cNvPr id="9" name="Rectangle 8"/>
+          <p:cNvSpPr/>
+          <p:nvPr/>
+        </p:nvSpPr>
+        <p:spPr>
+          <a:xfrm>
+            <a:off x="2100943" y="4376129"/>
+            <a:ext cx="4764314" cy="1995643"/>
+          </a:xfrm>
+          <a:prstGeom prst="rect">
+            <a:avLst/>
+          </a:prstGeom>
+          <a:noFill/>
+          <a:ln w="25400">
+            <a:solidFill>
+              <a:schemeClr val="tx1"/>
+            </a:solidFill>
+          </a:ln>
+        </p:spPr>
+        <p:style>
+          <a:lnRef idx="2">
+            <a:schemeClr val="accent1">
+              <a:shade val="50000"/>
+            </a:schemeClr>
+          </a:lnRef>
+          <a:fillRef idx="1">
+            <a:schemeClr val="accent1"/>
+          </a:fillRef>
+          <a:effectRef idx="0">
+            <a:schemeClr val="accent1"/>
+          </a:effectRef>
+          <a:fontRef idx="minor">
+            <a:schemeClr val="lt1"/>
+          </a:fontRef>
+        </p:style>
+        <p:txBody>
+          <a:bodyPr rtlCol="0" anchor="ctr"/>
+          <a:lstStyle/>
+          <a:p>
+            <a:pPr algn="ctr"/>
+            <a:endParaRPr lang="en-US" b="1" dirty="0">
+              <a:solidFill>
+                <a:srgbClr val="C00000"/>
+              </a:solidFill>
+            </a:endParaRPr>
+          </a:p>
+          <a:p>
+            <a:pPr algn="ctr"/>
+            <a:endParaRPr lang="en-US" b="1" dirty="0">
+              <a:solidFill>
+                <a:srgbClr val="C00000"/>
+              </a:solidFill>
+            </a:endParaRPr>
+          </a:p>
+          <a:p>
+            <a:pPr algn="ctr"/>
+            <a:endParaRPr lang="en-US" b="1" dirty="0">
+              <a:solidFill>
+                <a:srgbClr val="C00000"/>
+              </a:solidFill>
+            </a:endParaRPr>
+          </a:p>
+          <a:p>
+            <a:pPr algn="ctr"/>
+            <a:endParaRPr lang="en-US" b="1" dirty="0">
+              <a:solidFill>
+                <a:srgbClr val="C00000"/>
+              </a:solidFill>
+            </a:endParaRPr>
+          </a:p>
+          <a:p>
+            <a:pPr algn="ctr"/>
+            <a:endParaRPr lang="en-US" b="1" dirty="0">
+              <a:solidFill>
+                <a:srgbClr val="C00000"/>
+              </a:solidFill>
+            </a:endParaRPr>
+          </a:p>
+          <a:p>
+            <a:pPr algn="ctr"/>
+            <a:endParaRPr lang="en-US" b="1" dirty="0">
+              <a:solidFill>
+                <a:srgbClr val="C00000"/>
+              </a:solidFill>
+            </a:endParaRPr>
+          </a:p>
+          <a:p>
+            <a:pPr algn="ctr"/>
+            <a:r>
+              <a:rPr lang="en-US" b="1" dirty="0">
+                <a:solidFill>
+                  <a:srgbClr val="C00000"/>
+                </a:solidFill>
+              </a:rPr>
+              <a:t>High-level Control Logic</a:t>
+            </a:r>
+          </a:p>
+        </p:txBody>
+      </p:sp>
+      <p:sp>
+        <p:nvSpPr>
+          <p:cNvPr id="10" name="Rectangle 9"/>
+          <p:cNvSpPr/>
+          <p:nvPr/>
+        </p:nvSpPr>
+        <p:spPr>
+          <a:xfrm>
+            <a:off x="7427686" y="4376129"/>
+            <a:ext cx="3945900" cy="1995643"/>
+          </a:xfrm>
+          <a:prstGeom prst="rect">
+            <a:avLst/>
+          </a:prstGeom>
+          <a:noFill/>
+          <a:ln w="25400">
+            <a:solidFill>
+              <a:schemeClr val="tx1"/>
+            </a:solidFill>
+          </a:ln>
+        </p:spPr>
+        <p:style>
+          <a:lnRef idx="2">
+            <a:schemeClr val="accent1">
+              <a:shade val="50000"/>
+            </a:schemeClr>
+          </a:lnRef>
+          <a:fillRef idx="1">
+            <a:schemeClr val="accent1"/>
+          </a:fillRef>
+          <a:effectRef idx="0">
+            <a:schemeClr val="accent1"/>
+          </a:effectRef>
+          <a:fontRef idx="minor">
+            <a:schemeClr val="lt1"/>
+          </a:fontRef>
+        </p:style>
+        <p:txBody>
+          <a:bodyPr rtlCol="0" anchor="ctr"/>
+          <a:lstStyle/>
+          <a:p>
+            <a:pPr algn="ctr"/>
+            <a:endParaRPr lang="en-US" b="1" dirty="0">
+              <a:solidFill>
+                <a:srgbClr val="C00000"/>
+              </a:solidFill>
+            </a:endParaRPr>
+          </a:p>
+          <a:p>
+            <a:pPr algn="ctr"/>
+            <a:endParaRPr lang="en-US" b="1" dirty="0">
+              <a:solidFill>
+                <a:srgbClr val="C00000"/>
+              </a:solidFill>
+            </a:endParaRPr>
+          </a:p>
+          <a:p>
+            <a:pPr algn="ctr"/>
+            <a:endParaRPr lang="en-US" b="1" dirty="0">
+              <a:solidFill>
+                <a:srgbClr val="C00000"/>
+              </a:solidFill>
+            </a:endParaRPr>
+          </a:p>
+          <a:p>
+            <a:pPr algn="ctr"/>
+            <a:endParaRPr lang="en-US" b="1" dirty="0">
+              <a:solidFill>
+                <a:srgbClr val="C00000"/>
+              </a:solidFill>
+            </a:endParaRPr>
+          </a:p>
+          <a:p>
+            <a:pPr algn="ctr"/>
+            <a:endParaRPr lang="en-US" b="1" dirty="0">
+              <a:solidFill>
+                <a:srgbClr val="C00000"/>
+              </a:solidFill>
+            </a:endParaRPr>
+          </a:p>
+          <a:p>
+            <a:pPr algn="ctr"/>
+            <a:endParaRPr lang="en-US" b="1" dirty="0">
+              <a:solidFill>
+                <a:srgbClr val="C00000"/>
+              </a:solidFill>
+            </a:endParaRPr>
+          </a:p>
+          <a:p>
+            <a:pPr algn="ctr"/>
+            <a:r>
+              <a:rPr lang="en-US" b="1" dirty="0">
+                <a:solidFill>
+                  <a:srgbClr val="C00000"/>
+                </a:solidFill>
+              </a:rPr>
+              <a:t>Low-level PID Control Logic</a:t>
+            </a:r>
+          </a:p>
+        </p:txBody>
+      </p:sp>
+      <p:sp>
+        <p:nvSpPr>
+          <p:cNvPr id="11" name="Rectangle 10"/>
+          <p:cNvSpPr/>
+          <p:nvPr/>
+        </p:nvSpPr>
+        <p:spPr>
+          <a:xfrm>
+            <a:off x="8882743" y="2119156"/>
+            <a:ext cx="2510629" cy="2082729"/>
+          </a:xfrm>
+          <a:prstGeom prst="rect">
+            <a:avLst/>
+          </a:prstGeom>
+          <a:noFill/>
+          <a:ln w="25400">
+            <a:solidFill>
+              <a:schemeClr val="tx1"/>
+            </a:solidFill>
+          </a:ln>
+        </p:spPr>
+        <p:style>
+          <a:lnRef idx="2">
+            <a:schemeClr val="accent1">
+              <a:shade val="50000"/>
+            </a:schemeClr>
+          </a:lnRef>
+          <a:fillRef idx="1">
+            <a:schemeClr val="accent1"/>
+          </a:fillRef>
+          <a:effectRef idx="0">
+            <a:schemeClr val="accent1"/>
+          </a:effectRef>
+          <a:fontRef idx="minor">
+            <a:schemeClr val="lt1"/>
+          </a:fontRef>
+        </p:style>
+        <p:txBody>
+          <a:bodyPr rtlCol="0" anchor="ctr"/>
+          <a:lstStyle/>
+          <a:p>
+            <a:pPr algn="ctr"/>
+            <a:endParaRPr lang="en-US" b="1" dirty="0">
+              <a:solidFill>
+                <a:srgbClr val="C00000"/>
+              </a:solidFill>
+            </a:endParaRPr>
+          </a:p>
+          <a:p>
+            <a:pPr algn="ctr"/>
+            <a:endParaRPr lang="en-US" b="1" dirty="0">
+              <a:solidFill>
+                <a:srgbClr val="C00000"/>
+              </a:solidFill>
+            </a:endParaRPr>
+          </a:p>
+          <a:p>
+            <a:pPr algn="ctr"/>
+            <a:endParaRPr lang="en-US" b="1" dirty="0">
+              <a:solidFill>
+                <a:srgbClr val="C00000"/>
+              </a:solidFill>
+            </a:endParaRPr>
+          </a:p>
+          <a:p>
+            <a:pPr algn="ctr"/>
+            <a:endParaRPr lang="en-US" b="1" dirty="0">
+              <a:solidFill>
+                <a:srgbClr val="C00000"/>
+              </a:solidFill>
+            </a:endParaRPr>
+          </a:p>
+          <a:p>
+            <a:pPr algn="ctr"/>
+            <a:endParaRPr lang="en-US" b="1" dirty="0">
+              <a:solidFill>
+                <a:srgbClr val="C00000"/>
+              </a:solidFill>
+            </a:endParaRPr>
+          </a:p>
+          <a:p>
+            <a:pPr algn="ctr"/>
+            <a:endParaRPr lang="en-US" b="1" dirty="0">
+              <a:solidFill>
+                <a:srgbClr val="C00000"/>
+              </a:solidFill>
+            </a:endParaRPr>
+          </a:p>
+          <a:p>
+            <a:pPr algn="ctr"/>
+            <a:r>
+              <a:rPr lang="en-US" b="1" dirty="0">
+                <a:solidFill>
+                  <a:srgbClr val="C00000"/>
+                </a:solidFill>
+              </a:rPr>
+              <a:t>Actuator I/O component</a:t>
+            </a:r>
+          </a:p>
+        </p:txBody>
+      </p:sp>
+    </p:spTree>
+    <p:extLst>
+      <p:ext uri="{BB962C8B-B14F-4D97-AF65-F5344CB8AC3E}">
+        <p14:creationId xmlns:p14="http://schemas.microsoft.com/office/powerpoint/2010/main" val="4137627524"/>
+      </p:ext>
+    </p:extLst>
+  </p:cSld>
+  <p:clrMapOvr>
+    <a:masterClrMapping/>
+  </p:clrMapOvr>
+</p:sld>
+</file>
+
+<file path=ppt/slides/slide7.xml><?xml version="1.0" encoding="utf-8"?>
+<p:sld xmlns:a="http://schemas.openxmlformats.org/drawingml/2006/main" xmlns:r="http://schemas.openxmlformats.org/officeDocument/2006/relationships" xmlns:p="http://schemas.openxmlformats.org/presentationml/2006/main">
+  <p:cSld>
+    <p:spTree>
+      <p:nvGrpSpPr>
+        <p:cNvPr id="1" name=""/>
+        <p:cNvGrpSpPr/>
+        <p:nvPr/>
+      </p:nvGrpSpPr>
+      <p:grpSpPr>
+        <a:xfrm>
+          <a:off x="0" y="0"/>
+          <a:ext cx="0" cy="0"/>
+          <a:chOff x="0" y="0"/>
+          <a:chExt cx="0" cy="0"/>
+        </a:xfrm>
+      </p:grpSpPr>
+      <p:pic>
+        <p:nvPicPr>
+          <p:cNvPr id="9" name="Picture 8"/>
+          <p:cNvPicPr>
+            <a:picLocks noChangeAspect="1"/>
+          </p:cNvPicPr>
+          <p:nvPr/>
+        </p:nvPicPr>
+        <p:blipFill>
+          <a:blip r:embed="rId2">
+            <a:extLst>
+              <a:ext uri="{28A0092B-C50C-407E-A947-70E740481C1C}">
+                <a14:useLocalDpi xmlns:a14="http://schemas.microsoft.com/office/drawing/2010/main" val="0"/>
+              </a:ext>
+            </a:extLst>
+          </a:blip>
+          <a:stretch>
+            <a:fillRect/>
+          </a:stretch>
+        </p:blipFill>
+        <p:spPr>
+          <a:xfrm>
+            <a:off x="2433124" y="3399942"/>
+            <a:ext cx="7325747" cy="3458058"/>
+          </a:xfrm>
+          <a:prstGeom prst="rect">
+            <a:avLst/>
+          </a:prstGeom>
+        </p:spPr>
+      </p:pic>
+      <p:pic>
+        <p:nvPicPr>
+          <p:cNvPr id="10" name="Picture 9"/>
+          <p:cNvPicPr>
+            <a:picLocks noChangeAspect="1"/>
+          </p:cNvPicPr>
+          <p:nvPr/>
+        </p:nvPicPr>
+        <p:blipFill>
+          <a:blip r:embed="rId3">
+            <a:extLst>
+              <a:ext uri="{28A0092B-C50C-407E-A947-70E740481C1C}">
+                <a14:useLocalDpi xmlns:a14="http://schemas.microsoft.com/office/drawing/2010/main" val="0"/>
+              </a:ext>
+            </a:extLst>
+          </a:blip>
+          <a:stretch>
+            <a:fillRect/>
+          </a:stretch>
+        </p:blipFill>
+        <p:spPr>
+          <a:xfrm>
+            <a:off x="2703282" y="0"/>
+            <a:ext cx="6785429" cy="2726612"/>
+          </a:xfrm>
+          <a:prstGeom prst="rect">
+            <a:avLst/>
+          </a:prstGeom>
+        </p:spPr>
+      </p:pic>
+      <p:pic>
+        <p:nvPicPr>
+          <p:cNvPr id="11" name="Picture 10"/>
+          <p:cNvPicPr>
+            <a:picLocks noChangeAspect="1"/>
+          </p:cNvPicPr>
+          <p:nvPr/>
+        </p:nvPicPr>
+        <p:blipFill>
+          <a:blip r:embed="rId4">
+            <a:extLst>
+              <a:ext uri="{28A0092B-C50C-407E-A947-70E740481C1C}">
+                <a14:useLocalDpi xmlns:a14="http://schemas.microsoft.com/office/drawing/2010/main" val="0"/>
+              </a:ext>
+            </a:extLst>
+          </a:blip>
+          <a:stretch>
+            <a:fillRect/>
+          </a:stretch>
+        </p:blipFill>
+        <p:spPr>
+          <a:xfrm>
+            <a:off x="2624746" y="2550052"/>
+            <a:ext cx="6942502" cy="977260"/>
+          </a:xfrm>
+          <a:prstGeom prst="rect">
+            <a:avLst/>
+          </a:prstGeom>
+          <a:noFill/>
+          <a:ln w="25400">
+            <a:solidFill>
+              <a:srgbClr val="0070C0"/>
+            </a:solidFill>
+          </a:ln>
+        </p:spPr>
+      </p:pic>
+      <p:sp>
+        <p:nvSpPr>
+          <p:cNvPr id="12" name="Curved Up Arrow 11"/>
+          <p:cNvSpPr/>
+          <p:nvPr/>
+        </p:nvSpPr>
+        <p:spPr>
+          <a:xfrm>
+            <a:off x="5682343" y="4200642"/>
+            <a:ext cx="1611086" cy="1076022"/>
+          </a:xfrm>
+          <a:prstGeom prst="curvedUpArrow">
+            <a:avLst/>
+          </a:prstGeom>
+          <a:solidFill>
+            <a:srgbClr val="7E0000"/>
+          </a:solidFill>
+          <a:ln>
+            <a:solidFill>
+              <a:srgbClr val="7E0000"/>
+            </a:solidFill>
+          </a:ln>
+        </p:spPr>
+        <p:style>
+          <a:lnRef idx="2">
+            <a:schemeClr val="accent1">
+              <a:shade val="50000"/>
+            </a:schemeClr>
+          </a:lnRef>
+          <a:fillRef idx="1">
+            <a:schemeClr val="accent1"/>
+          </a:fillRef>
+          <a:effectRef idx="0">
+            <a:schemeClr val="accent1"/>
+          </a:effectRef>
+          <a:fontRef idx="minor">
+            <a:schemeClr val="lt1"/>
+          </a:fontRef>
+        </p:style>
+        <p:txBody>
+          <a:bodyPr rtlCol="0" anchor="ctr"/>
+          <a:lstStyle/>
+          <a:p>
+            <a:pPr algn="ctr"/>
+            <a:endParaRPr lang="en-US">
+              <a:solidFill>
+                <a:schemeClr val="tx1"/>
+              </a:solidFill>
+            </a:endParaRPr>
+          </a:p>
+        </p:txBody>
+      </p:sp>
+    </p:spTree>
+    <p:extLst>
+      <p:ext uri="{BB962C8B-B14F-4D97-AF65-F5344CB8AC3E}">
+        <p14:creationId xmlns:p14="http://schemas.microsoft.com/office/powerpoint/2010/main" val="893125644"/>
+      </p:ext>
+    </p:extLst>
+  </p:cSld>
+  <p:clrMapOvr>
+    <a:masterClrMapping/>
+  </p:clrMapOvr>
+</p:sld>
+</file>
+
+<file path=ppt/slides/slide8.xml><?xml version="1.0" encoding="utf-8"?>
+<p:sld xmlns:a="http://schemas.openxmlformats.org/drawingml/2006/main" xmlns:r="http://schemas.openxmlformats.org/officeDocument/2006/relationships" xmlns:p="http://schemas.openxmlformats.org/presentationml/2006/main">
+  <p:cSld>
+    <p:spTree>
+      <p:nvGrpSpPr>
+        <p:cNvPr id="1" name=""/>
+        <p:cNvGrpSpPr/>
+        <p:nvPr/>
+      </p:nvGrpSpPr>
+      <p:grpSpPr>
+        <a:xfrm>
+          <a:off x="0" y="0"/>
+          <a:ext cx="0" cy="0"/>
+          <a:chOff x="0" y="0"/>
+          <a:chExt cx="0" cy="0"/>
+        </a:xfrm>
+      </p:grpSpPr>
+      <p:sp>
+        <p:nvSpPr>
+          <p:cNvPr id="2" name="Title 1"/>
+          <p:cNvSpPr>
+            <a:spLocks noGrp="1"/>
+          </p:cNvSpPr>
+          <p:nvPr>
+            <p:ph type="title"/>
+          </p:nvPr>
+        </p:nvSpPr>
+        <p:spPr/>
+        <p:txBody>
+          <a:bodyPr/>
+          <a:lstStyle/>
+          <a:p>
+            <a:endParaRPr lang="en-US"/>
+          </a:p>
+        </p:txBody>
+      </p:sp>
+      <p:sp>
+        <p:nvSpPr>
+          <p:cNvPr id="3" name="Content Placeholder 2"/>
+          <p:cNvSpPr>
+            <a:spLocks noGrp="1"/>
+          </p:cNvSpPr>
+          <p:nvPr>
+            <p:ph idx="1"/>
+          </p:nvPr>
+        </p:nvSpPr>
+        <p:spPr/>
+        <p:txBody>
+          <a:bodyPr/>
+          <a:lstStyle/>
+          <a:p>
+            <a:endParaRPr lang="en-US"/>
+          </a:p>
+        </p:txBody>
+      </p:sp>
+    </p:spTree>
+    <p:extLst>
+      <p:ext uri="{BB962C8B-B14F-4D97-AF65-F5344CB8AC3E}">
+        <p14:creationId xmlns:p14="http://schemas.microsoft.com/office/powerpoint/2010/main" val="1508874267"/>
+      </p:ext>
+    </p:extLst>
+  </p:cSld>
+  <p:clrMapOvr>
+    <a:masterClrMapping/>
+  </p:clrMapOvr>
+</p:sld>
+</file>
+
 <file path=ppt/theme/theme1.xml><?xml version="1.0" encoding="utf-8"?>
 <a:theme xmlns:a="http://schemas.openxmlformats.org/drawingml/2006/main" name="Office Theme">
   <a:themeElements>

</xml_diff>

<commit_message>
Updated dissertation following all review comments
</commit_message>
<xml_diff>
--- a/src/img/source-2.pptx
+++ b/src/img/source-2.pptx
@@ -248,7 +248,7 @@
           <a:p>
             <a:fld id="{E1F60DCA-AAD4-4732-9BAD-8406E14A866C}" type="datetimeFigureOut">
               <a:rPr lang="en-US" smtClean="0"/>
-              <a:t>5/20/2016</a:t>
+              <a:t>5/23/2016</a:t>
             </a:fld>
             <a:endParaRPr lang="en-US" dirty="0"/>
           </a:p>
@@ -416,7 +416,7 @@
           <a:p>
             <a:fld id="{E1F60DCA-AAD4-4732-9BAD-8406E14A866C}" type="datetimeFigureOut">
               <a:rPr lang="en-US" smtClean="0"/>
-              <a:t>5/20/2016</a:t>
+              <a:t>5/23/2016</a:t>
             </a:fld>
             <a:endParaRPr lang="en-US" dirty="0"/>
           </a:p>
@@ -594,7 +594,7 @@
           <a:p>
             <a:fld id="{E1F60DCA-AAD4-4732-9BAD-8406E14A866C}" type="datetimeFigureOut">
               <a:rPr lang="en-US" smtClean="0"/>
-              <a:t>5/20/2016</a:t>
+              <a:t>5/23/2016</a:t>
             </a:fld>
             <a:endParaRPr lang="en-US" dirty="0"/>
           </a:p>
@@ -762,7 +762,7 @@
           <a:p>
             <a:fld id="{E1F60DCA-AAD4-4732-9BAD-8406E14A866C}" type="datetimeFigureOut">
               <a:rPr lang="en-US" smtClean="0"/>
-              <a:t>5/20/2016</a:t>
+              <a:t>5/23/2016</a:t>
             </a:fld>
             <a:endParaRPr lang="en-US" dirty="0"/>
           </a:p>
@@ -1007,7 +1007,7 @@
           <a:p>
             <a:fld id="{E1F60DCA-AAD4-4732-9BAD-8406E14A866C}" type="datetimeFigureOut">
               <a:rPr lang="en-US" smtClean="0"/>
-              <a:t>5/20/2016</a:t>
+              <a:t>5/23/2016</a:t>
             </a:fld>
             <a:endParaRPr lang="en-US" dirty="0"/>
           </a:p>
@@ -1236,7 +1236,7 @@
           <a:p>
             <a:fld id="{E1F60DCA-AAD4-4732-9BAD-8406E14A866C}" type="datetimeFigureOut">
               <a:rPr lang="en-US" smtClean="0"/>
-              <a:t>5/20/2016</a:t>
+              <a:t>5/23/2016</a:t>
             </a:fld>
             <a:endParaRPr lang="en-US" dirty="0"/>
           </a:p>
@@ -1600,7 +1600,7 @@
           <a:p>
             <a:fld id="{E1F60DCA-AAD4-4732-9BAD-8406E14A866C}" type="datetimeFigureOut">
               <a:rPr lang="en-US" smtClean="0"/>
-              <a:t>5/20/2016</a:t>
+              <a:t>5/23/2016</a:t>
             </a:fld>
             <a:endParaRPr lang="en-US" dirty="0"/>
           </a:p>
@@ -1717,7 +1717,7 @@
           <a:p>
             <a:fld id="{E1F60DCA-AAD4-4732-9BAD-8406E14A866C}" type="datetimeFigureOut">
               <a:rPr lang="en-US" smtClean="0"/>
-              <a:t>5/20/2016</a:t>
+              <a:t>5/23/2016</a:t>
             </a:fld>
             <a:endParaRPr lang="en-US" dirty="0"/>
           </a:p>
@@ -1812,7 +1812,7 @@
           <a:p>
             <a:fld id="{E1F60DCA-AAD4-4732-9BAD-8406E14A866C}" type="datetimeFigureOut">
               <a:rPr lang="en-US" smtClean="0"/>
-              <a:t>5/20/2016</a:t>
+              <a:t>5/23/2016</a:t>
             </a:fld>
             <a:endParaRPr lang="en-US" dirty="0"/>
           </a:p>
@@ -2087,7 +2087,7 @@
           <a:p>
             <a:fld id="{E1F60DCA-AAD4-4732-9BAD-8406E14A866C}" type="datetimeFigureOut">
               <a:rPr lang="en-US" smtClean="0"/>
-              <a:t>5/20/2016</a:t>
+              <a:t>5/23/2016</a:t>
             </a:fld>
             <a:endParaRPr lang="en-US" dirty="0"/>
           </a:p>
@@ -2339,7 +2339,7 @@
           <a:p>
             <a:fld id="{E1F60DCA-AAD4-4732-9BAD-8406E14A866C}" type="datetimeFigureOut">
               <a:rPr lang="en-US" smtClean="0"/>
-              <a:t>5/20/2016</a:t>
+              <a:t>5/23/2016</a:t>
             </a:fld>
             <a:endParaRPr lang="en-US" dirty="0"/>
           </a:p>
@@ -2550,7 +2550,7 @@
           <a:p>
             <a:fld id="{E1F60DCA-AAD4-4732-9BAD-8406E14A866C}" type="datetimeFigureOut">
               <a:rPr lang="en-US" smtClean="0"/>
-              <a:t>5/20/2016</a:t>
+              <a:t>5/23/2016</a:t>
             </a:fld>
             <a:endParaRPr lang="en-US" dirty="0"/>
           </a:p>
@@ -4725,7 +4725,7 @@
       </p:pic>
       <p:pic>
         <p:nvPicPr>
-          <p:cNvPr id="10" name="Picture 9"/>
+          <p:cNvPr id="11" name="Picture 10"/>
           <p:cNvPicPr>
             <a:picLocks noChangeAspect="1"/>
           </p:cNvPicPr>
@@ -4745,37 +4745,7 @@
         </p:blipFill>
         <p:spPr>
           <a:xfrm>
-            <a:off x="2703282" y="0"/>
-            <a:ext cx="6785429" cy="2726612"/>
-          </a:xfrm>
-          <a:prstGeom prst="rect">
-            <a:avLst/>
-          </a:prstGeom>
-        </p:spPr>
-      </p:pic>
-      <p:pic>
-        <p:nvPicPr>
-          <p:cNvPr id="11" name="Picture 10"/>
-          <p:cNvPicPr>
-            <a:picLocks noChangeAspect="1"/>
-          </p:cNvPicPr>
-          <p:nvPr/>
-        </p:nvPicPr>
-        <p:blipFill>
-          <a:blip r:embed="rId4">
-            <a:extLst>
-              <a:ext uri="{28A0092B-C50C-407E-A947-70E740481C1C}">
-                <a14:useLocalDpi xmlns:a14="http://schemas.microsoft.com/office/drawing/2010/main" val="0"/>
-              </a:ext>
-            </a:extLst>
-          </a:blip>
-          <a:stretch>
-            <a:fillRect/>
-          </a:stretch>
-        </p:blipFill>
-        <p:spPr>
-          <a:xfrm>
-            <a:off x="2624746" y="2550052"/>
+            <a:off x="2679850" y="2520994"/>
             <a:ext cx="6942502" cy="977260"/>
           </a:xfrm>
           <a:prstGeom prst="rect">
@@ -4838,6 +4808,54 @@
                 <a:schemeClr val="tx1"/>
               </a:solidFill>
             </a:endParaRPr>
+          </a:p>
+        </p:txBody>
+      </p:sp>
+      <p:sp>
+        <p:nvSpPr>
+          <p:cNvPr id="2" name="Rectangle 1"/>
+          <p:cNvSpPr/>
+          <p:nvPr/>
+        </p:nvSpPr>
+        <p:spPr>
+          <a:xfrm>
+            <a:off x="2433124" y="1540201"/>
+            <a:ext cx="7435954" cy="1079105"/>
+          </a:xfrm>
+          <a:prstGeom prst="rect">
+            <a:avLst/>
+          </a:prstGeom>
+          <a:solidFill>
+            <a:schemeClr val="accent5">
+              <a:lumMod val="50000"/>
+            </a:schemeClr>
+          </a:solidFill>
+        </p:spPr>
+        <p:style>
+          <a:lnRef idx="2">
+            <a:schemeClr val="accent1">
+              <a:shade val="50000"/>
+            </a:schemeClr>
+          </a:lnRef>
+          <a:fillRef idx="1">
+            <a:schemeClr val="accent1"/>
+          </a:fillRef>
+          <a:effectRef idx="0">
+            <a:schemeClr val="accent1"/>
+          </a:effectRef>
+          <a:fontRef idx="minor">
+            <a:schemeClr val="lt1"/>
+          </a:fontRef>
+        </p:style>
+        <p:txBody>
+          <a:bodyPr rtlCol="0" anchor="ctr"/>
+          <a:lstStyle/>
+          <a:p>
+            <a:pPr algn="ctr"/>
+            <a:r>
+              <a:rPr lang="en-US" sz="4000" dirty="0"/>
+              <a:t>Kerbal Space Program</a:t>
+            </a:r>
           </a:p>
         </p:txBody>
       </p:sp>

</xml_diff>